<commit_message>
adding pdf of bash-talk
</commit_message>
<xml_diff>
--- a/presentation/bash-talk.pptx
+++ b/presentation/bash-talk.pptx
@@ -23232,6 +23232,14 @@
 <file path=ppt/slides/slide15.xml><?xml version="1.0" encoding="utf-8"?>
 <p:sld xmlns:a="http://schemas.openxmlformats.org/drawingml/2006/main" xmlns:r="http://schemas.openxmlformats.org/officeDocument/2006/relationships" xmlns:p="http://schemas.openxmlformats.org/presentationml/2006/main">
   <p:cSld>
+    <p:bg>
+      <p:bgPr>
+        <a:solidFill>
+          <a:schemeClr val="bg2"/>
+        </a:solidFill>
+        <a:effectLst/>
+      </p:bgPr>
+    </p:bg>
     <p:spTree>
       <p:nvGrpSpPr>
         <p:cNvPr id="1" name=""/>
@@ -23246,6 +23254,242 @@
           <a:chExt cx="0" cy="0"/>
         </a:xfrm>
       </p:grpSpPr>
+      <p:grpSp>
+        <p:nvGrpSpPr>
+          <p:cNvPr id="19" name="Group 8">
+            <a:extLst>
+              <a:ext uri="{FF2B5EF4-FFF2-40B4-BE49-F238E27FC236}">
+                <a16:creationId xmlns:a16="http://schemas.microsoft.com/office/drawing/2014/main" id="{449BC34D-9C23-4D6D-8213-1F471AF85B3F}"/>
+              </a:ext>
+              <a:ext uri="{C183D7F6-B498-43B3-948B-1728B52AA6E4}">
+                <adec:decorative xmlns:adec="http://schemas.microsoft.com/office/drawing/2017/decorative" val="1"/>
+              </a:ext>
+            </a:extLst>
+          </p:cNvPr>
+          <p:cNvGrpSpPr>
+            <a:grpSpLocks noGrp="1" noUngrp="1" noRot="1" noChangeAspect="1" noMove="1" noResize="1"/>
+          </p:cNvGrpSpPr>
+          <p:nvPr>
+            <p:extLst>
+              <p:ext uri="{386F3935-93C4-4BCD-93E2-E3B085C9AB24}">
+                <p16:designElem xmlns:p16="http://schemas.microsoft.com/office/powerpoint/2015/main" val="1"/>
+              </p:ext>
+            </p:extLst>
+          </p:nvPr>
+        </p:nvGrpSpPr>
+        <p:grpSpPr>
+          <a:xfrm>
+            <a:off x="752858" y="744469"/>
+            <a:ext cx="10674117" cy="5349671"/>
+            <a:chOff x="752858" y="744469"/>
+            <a:chExt cx="10674117" cy="5349671"/>
+          </a:xfrm>
+        </p:grpSpPr>
+        <p:sp>
+          <p:nvSpPr>
+            <p:cNvPr id="10" name="Freeform 6">
+              <a:extLst>
+                <a:ext uri="{FF2B5EF4-FFF2-40B4-BE49-F238E27FC236}">
+                  <a16:creationId xmlns:a16="http://schemas.microsoft.com/office/drawing/2014/main" id="{FA0F5D6C-5025-4D7E-82DD-C2C6FDA1E759}"/>
+                </a:ext>
+                <a:ext uri="{C183D7F6-B498-43B3-948B-1728B52AA6E4}">
+                  <adec:decorative xmlns:adec="http://schemas.microsoft.com/office/drawing/2017/decorative" val="1"/>
+                </a:ext>
+              </a:extLst>
+            </p:cNvPr>
+            <p:cNvSpPr/>
+            <p:nvPr>
+              <p:extLst>
+                <p:ext uri="{386F3935-93C4-4BCD-93E2-E3B085C9AB24}">
+                  <p16:designElem xmlns:p16="http://schemas.microsoft.com/office/powerpoint/2015/main" val="1"/>
+                </p:ext>
+              </p:extLst>
+            </p:nvPr>
+          </p:nvSpPr>
+          <p:spPr bwMode="auto">
+            <a:xfrm>
+              <a:off x="8151962" y="1685652"/>
+              <a:ext cx="3275013" cy="4408488"/>
+            </a:xfrm>
+            <a:custGeom>
+              <a:avLst/>
+              <a:gdLst/>
+              <a:ahLst/>
+              <a:cxnLst/>
+              <a:rect l="l" t="t" r="r" b="b"/>
+              <a:pathLst>
+                <a:path w="10000" h="10000">
+                  <a:moveTo>
+                    <a:pt x="8761" y="0"/>
+                  </a:moveTo>
+                  <a:lnTo>
+                    <a:pt x="10000" y="0"/>
+                  </a:lnTo>
+                  <a:lnTo>
+                    <a:pt x="10000" y="10000"/>
+                  </a:lnTo>
+                  <a:lnTo>
+                    <a:pt x="0" y="10000"/>
+                  </a:lnTo>
+                  <a:lnTo>
+                    <a:pt x="0" y="9126"/>
+                  </a:lnTo>
+                  <a:lnTo>
+                    <a:pt x="8761" y="9127"/>
+                  </a:lnTo>
+                  <a:lnTo>
+                    <a:pt x="8761" y="0"/>
+                  </a:lnTo>
+                  <a:close/>
+                </a:path>
+              </a:pathLst>
+            </a:custGeom>
+            <a:solidFill>
+              <a:schemeClr val="tx2"/>
+            </a:solidFill>
+            <a:ln w="0">
+              <a:noFill/>
+              <a:prstDash val="solid"/>
+              <a:round/>
+              <a:headEnd/>
+              <a:tailEnd/>
+            </a:ln>
+          </p:spPr>
+        </p:sp>
+        <p:sp>
+          <p:nvSpPr>
+            <p:cNvPr id="11" name="Freeform 6">
+              <a:extLst>
+                <a:ext uri="{FF2B5EF4-FFF2-40B4-BE49-F238E27FC236}">
+                  <a16:creationId xmlns:a16="http://schemas.microsoft.com/office/drawing/2014/main" id="{E2AF2C17-4AB4-4402-B84B-129EF95D161C}"/>
+                </a:ext>
+                <a:ext uri="{C183D7F6-B498-43B3-948B-1728B52AA6E4}">
+                  <adec:decorative xmlns:adec="http://schemas.microsoft.com/office/drawing/2017/decorative" val="1"/>
+                </a:ext>
+              </a:extLst>
+            </p:cNvPr>
+            <p:cNvSpPr/>
+            <p:nvPr>
+              <p:extLst>
+                <p:ext uri="{386F3935-93C4-4BCD-93E2-E3B085C9AB24}">
+                  <p16:designElem xmlns:p16="http://schemas.microsoft.com/office/powerpoint/2015/main" val="1"/>
+                </p:ext>
+              </p:extLst>
+            </p:nvPr>
+          </p:nvSpPr>
+          <p:spPr bwMode="auto">
+            <a:xfrm flipH="1" flipV="1">
+              <a:off x="752858" y="744469"/>
+              <a:ext cx="3275668" cy="4408488"/>
+            </a:xfrm>
+            <a:custGeom>
+              <a:avLst/>
+              <a:gdLst/>
+              <a:ahLst/>
+              <a:cxnLst/>
+              <a:rect l="l" t="t" r="r" b="b"/>
+              <a:pathLst>
+                <a:path w="10002" h="10000">
+                  <a:moveTo>
+                    <a:pt x="8763" y="0"/>
+                  </a:moveTo>
+                  <a:lnTo>
+                    <a:pt x="10002" y="0"/>
+                  </a:lnTo>
+                  <a:lnTo>
+                    <a:pt x="10002" y="10000"/>
+                  </a:lnTo>
+                  <a:lnTo>
+                    <a:pt x="2" y="10000"/>
+                  </a:lnTo>
+                  <a:cubicBezTo>
+                    <a:pt x="-2" y="9698"/>
+                    <a:pt x="4" y="9427"/>
+                    <a:pt x="0" y="9125"/>
+                  </a:cubicBezTo>
+                  <a:lnTo>
+                    <a:pt x="8763" y="9128"/>
+                  </a:lnTo>
+                  <a:lnTo>
+                    <a:pt x="8763" y="0"/>
+                  </a:lnTo>
+                  <a:close/>
+                </a:path>
+              </a:pathLst>
+            </a:custGeom>
+            <a:solidFill>
+              <a:schemeClr val="tx2"/>
+            </a:solidFill>
+            <a:ln w="0">
+              <a:noFill/>
+              <a:prstDash val="solid"/>
+              <a:round/>
+              <a:headEnd/>
+              <a:tailEnd/>
+            </a:ln>
+          </p:spPr>
+        </p:sp>
+      </p:grpSp>
+      <p:sp useBgFill="1">
+        <p:nvSpPr>
+          <p:cNvPr id="20" name="Rectangle 12">
+            <a:extLst>
+              <a:ext uri="{FF2B5EF4-FFF2-40B4-BE49-F238E27FC236}">
+                <a16:creationId xmlns:a16="http://schemas.microsoft.com/office/drawing/2014/main" id="{692296C6-28F7-4BD7-9EFB-22A268E3D42B}"/>
+              </a:ext>
+              <a:ext uri="{C183D7F6-B498-43B3-948B-1728B52AA6E4}">
+                <adec:decorative xmlns:adec="http://schemas.microsoft.com/office/drawing/2017/decorative" val="1"/>
+              </a:ext>
+            </a:extLst>
+          </p:cNvPr>
+          <p:cNvSpPr>
+            <a:spLocks noGrp="1" noRot="1" noChangeAspect="1" noMove="1" noResize="1" noEditPoints="1" noAdjustHandles="1" noChangeArrowheads="1" noChangeShapeType="1" noTextEdit="1"/>
+          </p:cNvSpPr>
+          <p:nvPr>
+            <p:extLst>
+              <p:ext uri="{386F3935-93C4-4BCD-93E2-E3B085C9AB24}">
+                <p16:designElem xmlns:p16="http://schemas.microsoft.com/office/powerpoint/2015/main" val="1"/>
+              </p:ext>
+            </p:extLst>
+          </p:nvPr>
+        </p:nvSpPr>
+        <p:spPr>
+          <a:xfrm>
+            <a:off x="0" y="0"/>
+            <a:ext cx="12192000" cy="6858000"/>
+          </a:xfrm>
+          <a:prstGeom prst="rect">
+            <a:avLst/>
+          </a:prstGeom>
+          <a:ln>
+            <a:noFill/>
+          </a:ln>
+        </p:spPr>
+        <p:style>
+          <a:lnRef idx="2">
+            <a:schemeClr val="accent1">
+              <a:shade val="50000"/>
+            </a:schemeClr>
+          </a:lnRef>
+          <a:fillRef idx="1">
+            <a:schemeClr val="accent1"/>
+          </a:fillRef>
+          <a:effectRef idx="0">
+            <a:schemeClr val="accent1"/>
+          </a:effectRef>
+          <a:fontRef idx="minor">
+            <a:schemeClr val="lt1"/>
+          </a:fontRef>
+        </p:style>
+        <p:txBody>
+          <a:bodyPr rtlCol="0" anchor="ctr"/>
+          <a:lstStyle/>
+          <a:p>
+            <a:pPr algn="ctr"/>
+            <a:endParaRPr lang="en-US"/>
+          </a:p>
+        </p:txBody>
+      </p:sp>
       <p:sp>
         <p:nvSpPr>
           <p:cNvPr id="2" name="Title 1">
@@ -23262,18 +23506,203 @@
             <p:ph type="title"/>
           </p:nvPr>
         </p:nvSpPr>
-        <p:spPr/>
+        <p:spPr>
+          <a:xfrm>
+            <a:off x="5954486" y="1480929"/>
+            <a:ext cx="5791426" cy="3254321"/>
+          </a:xfrm>
+        </p:spPr>
         <p:txBody>
-          <a:bodyPr/>
+          <a:bodyPr vert="horz" lIns="91440" tIns="45720" rIns="91440" bIns="45720" rtlCol="0" anchor="b" anchorCtr="0">
+            <a:normAutofit/>
+          </a:bodyPr>
           <a:lstStyle/>
           <a:p>
             <a:r>
-              <a:rPr lang="en-US"/>
-              <a:t>Thanks</a:t>
+              <a:rPr lang="en-US" sz="7000" cap="all"/>
+              <a:t>Thanks  </a:t>
             </a:r>
           </a:p>
         </p:txBody>
       </p:sp>
+      <p:sp>
+        <p:nvSpPr>
+          <p:cNvPr id="21" name="Freeform 6">
+            <a:extLst>
+              <a:ext uri="{FF2B5EF4-FFF2-40B4-BE49-F238E27FC236}">
+                <a16:creationId xmlns:a16="http://schemas.microsoft.com/office/drawing/2014/main" id="{CBB17300-EE76-409B-97FE-4836C5093DB3}"/>
+              </a:ext>
+              <a:ext uri="{C183D7F6-B498-43B3-948B-1728B52AA6E4}">
+                <adec:decorative xmlns:adec="http://schemas.microsoft.com/office/drawing/2017/decorative" val="1"/>
+              </a:ext>
+            </a:extLst>
+          </p:cNvPr>
+          <p:cNvSpPr>
+            <a:spLocks noGrp="1" noRot="1" noChangeAspect="1" noMove="1" noResize="1" noEditPoints="1" noAdjustHandles="1" noChangeArrowheads="1" noChangeShapeType="1" noTextEdit="1"/>
+          </p:cNvSpPr>
+          <p:nvPr>
+            <p:extLst>
+              <p:ext uri="{386F3935-93C4-4BCD-93E2-E3B085C9AB24}">
+                <p16:designElem xmlns:p16="http://schemas.microsoft.com/office/powerpoint/2015/main" val="1"/>
+              </p:ext>
+            </p:extLst>
+          </p:nvPr>
+        </p:nvSpPr>
+        <p:spPr bwMode="auto">
+          <a:xfrm>
+            <a:off x="2199584" y="1685652"/>
+            <a:ext cx="3275013" cy="4408488"/>
+          </a:xfrm>
+          <a:custGeom>
+            <a:avLst/>
+            <a:gdLst/>
+            <a:ahLst/>
+            <a:cxnLst/>
+            <a:rect l="l" t="t" r="r" b="b"/>
+            <a:pathLst>
+              <a:path w="10000" h="10000">
+                <a:moveTo>
+                  <a:pt x="8761" y="0"/>
+                </a:moveTo>
+                <a:lnTo>
+                  <a:pt x="10000" y="0"/>
+                </a:lnTo>
+                <a:lnTo>
+                  <a:pt x="10000" y="10000"/>
+                </a:lnTo>
+                <a:lnTo>
+                  <a:pt x="0" y="10000"/>
+                </a:lnTo>
+                <a:lnTo>
+                  <a:pt x="0" y="9126"/>
+                </a:lnTo>
+                <a:lnTo>
+                  <a:pt x="8761" y="9127"/>
+                </a:lnTo>
+                <a:lnTo>
+                  <a:pt x="8761" y="0"/>
+                </a:lnTo>
+                <a:close/>
+              </a:path>
+            </a:pathLst>
+          </a:custGeom>
+          <a:solidFill>
+            <a:schemeClr val="tx2"/>
+          </a:solidFill>
+          <a:ln w="0">
+            <a:noFill/>
+            <a:prstDash val="solid"/>
+            <a:round/>
+            <a:headEnd/>
+            <a:tailEnd/>
+          </a:ln>
+        </p:spPr>
+      </p:sp>
+      <p:sp>
+        <p:nvSpPr>
+          <p:cNvPr id="22" name="Freeform 6">
+            <a:extLst>
+              <a:ext uri="{FF2B5EF4-FFF2-40B4-BE49-F238E27FC236}">
+                <a16:creationId xmlns:a16="http://schemas.microsoft.com/office/drawing/2014/main" id="{AEABCDF0-66B8-40A9-98EB-B6837EF185E2}"/>
+              </a:ext>
+              <a:ext uri="{C183D7F6-B498-43B3-948B-1728B52AA6E4}">
+                <adec:decorative xmlns:adec="http://schemas.microsoft.com/office/drawing/2017/decorative" val="1"/>
+              </a:ext>
+            </a:extLst>
+          </p:cNvPr>
+          <p:cNvSpPr>
+            <a:spLocks noGrp="1" noRot="1" noChangeAspect="1" noMove="1" noResize="1" noEditPoints="1" noAdjustHandles="1" noChangeArrowheads="1" noChangeShapeType="1" noTextEdit="1"/>
+          </p:cNvSpPr>
+          <p:nvPr>
+            <p:extLst>
+              <p:ext uri="{386F3935-93C4-4BCD-93E2-E3B085C9AB24}">
+                <p16:designElem xmlns:p16="http://schemas.microsoft.com/office/powerpoint/2015/main" val="1"/>
+              </p:ext>
+            </p:extLst>
+          </p:nvPr>
+        </p:nvSpPr>
+        <p:spPr bwMode="auto">
+          <a:xfrm flipH="1" flipV="1">
+            <a:off x="752858" y="744469"/>
+            <a:ext cx="3275668" cy="4408488"/>
+          </a:xfrm>
+          <a:custGeom>
+            <a:avLst/>
+            <a:gdLst/>
+            <a:ahLst/>
+            <a:cxnLst/>
+            <a:rect l="l" t="t" r="r" b="b"/>
+            <a:pathLst>
+              <a:path w="10002" h="10000">
+                <a:moveTo>
+                  <a:pt x="8763" y="0"/>
+                </a:moveTo>
+                <a:lnTo>
+                  <a:pt x="10002" y="0"/>
+                </a:lnTo>
+                <a:lnTo>
+                  <a:pt x="10002" y="10000"/>
+                </a:lnTo>
+                <a:lnTo>
+                  <a:pt x="2" y="10000"/>
+                </a:lnTo>
+                <a:cubicBezTo>
+                  <a:pt x="-2" y="9698"/>
+                  <a:pt x="4" y="9427"/>
+                  <a:pt x="0" y="9125"/>
+                </a:cubicBezTo>
+                <a:lnTo>
+                  <a:pt x="8763" y="9128"/>
+                </a:lnTo>
+                <a:lnTo>
+                  <a:pt x="8763" y="0"/>
+                </a:lnTo>
+                <a:close/>
+              </a:path>
+            </a:pathLst>
+          </a:custGeom>
+          <a:solidFill>
+            <a:schemeClr val="tx2"/>
+          </a:solidFill>
+          <a:ln w="0">
+            <a:noFill/>
+            <a:prstDash val="solid"/>
+            <a:round/>
+            <a:headEnd/>
+            <a:tailEnd/>
+          </a:ln>
+        </p:spPr>
+      </p:sp>
+      <p:pic>
+        <p:nvPicPr>
+          <p:cNvPr id="4" name="Picture 3" descr="A close up of a sign&#10;&#10;Description automatically generated">
+            <a:extLst>
+              <a:ext uri="{FF2B5EF4-FFF2-40B4-BE49-F238E27FC236}">
+                <a16:creationId xmlns:a16="http://schemas.microsoft.com/office/drawing/2014/main" id="{CACBDA2E-4C26-C44B-B551-D294F1E16E27}"/>
+              </a:ext>
+            </a:extLst>
+          </p:cNvPr>
+          <p:cNvPicPr>
+            <a:picLocks noChangeAspect="1"/>
+          </p:cNvPicPr>
+          <p:nvPr/>
+        </p:nvPicPr>
+        <p:blipFill>
+          <a:blip r:embed="rId2"/>
+          <a:stretch>
+            <a:fillRect/>
+          </a:stretch>
+        </p:blipFill>
+        <p:spPr>
+          <a:xfrm>
+            <a:off x="1480173" y="1668566"/>
+            <a:ext cx="3267942" cy="3512274"/>
+          </a:xfrm>
+          <a:prstGeom prst="rect">
+            <a:avLst/>
+          </a:prstGeom>
+        </p:spPr>
+      </p:pic>
     </p:spTree>
     <p:extLst>
       <p:ext uri="{BB962C8B-B14F-4D97-AF65-F5344CB8AC3E}">

</xml_diff>